<commit_message>
Apply glossary terms in BSP Connection page
</commit_message>
<xml_diff>
--- a/VEEPortingGuide/images/vee-port-creation.pptx
+++ b/VEEPortingGuide/images/vee-port-creation.pptx
@@ -199,7 +199,7 @@
           <a:p>
             <a:fld id="{B5788EEA-FAB9-421D-801B-2F0B0BC89D57}" type="datetimeFigureOut">
               <a:rPr lang="en-US" smtClean="0"/>
-              <a:t>6/19/2024</a:t>
+              <a:t>10/25/2024</a:t>
             </a:fld>
             <a:endParaRPr lang="en-US"/>
           </a:p>
@@ -753,7 +753,7 @@
           <a:p>
             <a:fld id="{8382ADF2-3FF2-4FB4-8A07-AE359359CF4F}" type="datetimeFigureOut">
               <a:rPr lang="en-GB" smtClean="0"/>
-              <a:t>19/06/2024</a:t>
+              <a:t>25/10/2024</a:t>
             </a:fld>
             <a:endParaRPr lang="en-GB"/>
           </a:p>
@@ -953,7 +953,7 @@
           <a:p>
             <a:fld id="{8382ADF2-3FF2-4FB4-8A07-AE359359CF4F}" type="datetimeFigureOut">
               <a:rPr lang="en-GB" smtClean="0"/>
-              <a:t>19/06/2024</a:t>
+              <a:t>25/10/2024</a:t>
             </a:fld>
             <a:endParaRPr lang="en-GB"/>
           </a:p>
@@ -1163,7 +1163,7 @@
           <a:p>
             <a:fld id="{8382ADF2-3FF2-4FB4-8A07-AE359359CF4F}" type="datetimeFigureOut">
               <a:rPr lang="en-GB" smtClean="0"/>
-              <a:t>19/06/2024</a:t>
+              <a:t>25/10/2024</a:t>
             </a:fld>
             <a:endParaRPr lang="en-GB"/>
           </a:p>
@@ -4187,7 +4187,7 @@
           <a:p>
             <a:fld id="{8382ADF2-3FF2-4FB4-8A07-AE359359CF4F}" type="datetimeFigureOut">
               <a:rPr lang="en-GB" smtClean="0"/>
-              <a:t>19/06/2024</a:t>
+              <a:t>25/10/2024</a:t>
             </a:fld>
             <a:endParaRPr lang="en-GB"/>
           </a:p>
@@ -8095,7 +8095,7 @@
           <a:p>
             <a:fld id="{8382ADF2-3FF2-4FB4-8A07-AE359359CF4F}" type="datetimeFigureOut">
               <a:rPr lang="en-GB" smtClean="0"/>
-              <a:t>19/06/2024</a:t>
+              <a:t>25/10/2024</a:t>
             </a:fld>
             <a:endParaRPr lang="en-GB"/>
           </a:p>
@@ -17295,7 +17295,7 @@
           <a:p>
             <a:fld id="{8382ADF2-3FF2-4FB4-8A07-AE359359CF4F}" type="datetimeFigureOut">
               <a:rPr lang="en-GB" smtClean="0"/>
-              <a:t>19/06/2024</a:t>
+              <a:t>25/10/2024</a:t>
             </a:fld>
             <a:endParaRPr lang="en-GB"/>
           </a:p>
@@ -17710,7 +17710,7 @@
           <a:p>
             <a:fld id="{8382ADF2-3FF2-4FB4-8A07-AE359359CF4F}" type="datetimeFigureOut">
               <a:rPr lang="en-GB" smtClean="0"/>
-              <a:t>19/06/2024</a:t>
+              <a:t>25/10/2024</a:t>
             </a:fld>
             <a:endParaRPr lang="en-GB"/>
           </a:p>
@@ -17852,7 +17852,7 @@
           <a:p>
             <a:fld id="{8382ADF2-3FF2-4FB4-8A07-AE359359CF4F}" type="datetimeFigureOut">
               <a:rPr lang="en-GB" smtClean="0"/>
-              <a:t>19/06/2024</a:t>
+              <a:t>25/10/2024</a:t>
             </a:fld>
             <a:endParaRPr lang="en-GB"/>
           </a:p>
@@ -17965,7 +17965,7 @@
           <a:p>
             <a:fld id="{8382ADF2-3FF2-4FB4-8A07-AE359359CF4F}" type="datetimeFigureOut">
               <a:rPr lang="en-GB" smtClean="0"/>
-              <a:t>19/06/2024</a:t>
+              <a:t>25/10/2024</a:t>
             </a:fld>
             <a:endParaRPr lang="en-GB"/>
           </a:p>
@@ -18278,7 +18278,7 @@
           <a:p>
             <a:fld id="{8382ADF2-3FF2-4FB4-8A07-AE359359CF4F}" type="datetimeFigureOut">
               <a:rPr lang="en-GB" smtClean="0"/>
-              <a:t>19/06/2024</a:t>
+              <a:t>25/10/2024</a:t>
             </a:fld>
             <a:endParaRPr lang="en-GB"/>
           </a:p>
@@ -18567,7 +18567,7 @@
           <a:p>
             <a:fld id="{8382ADF2-3FF2-4FB4-8A07-AE359359CF4F}" type="datetimeFigureOut">
               <a:rPr lang="en-GB" smtClean="0"/>
-              <a:t>19/06/2024</a:t>
+              <a:t>25/10/2024</a:t>
             </a:fld>
             <a:endParaRPr lang="en-GB"/>
           </a:p>
@@ -18810,7 +18810,7 @@
           <a:p>
             <a:fld id="{8382ADF2-3FF2-4FB4-8A07-AE359359CF4F}" type="datetimeFigureOut">
               <a:rPr lang="en-GB" smtClean="0"/>
-              <a:t>19/06/2024</a:t>
+              <a:t>25/10/2024</a:t>
             </a:fld>
             <a:endParaRPr lang="en-GB"/>
           </a:p>
@@ -19983,7 +19983,7 @@
               <a:defRPr/>
             </a:pPr>
             <a:r>
-              <a:rPr lang="en-US" sz="1200" b="1" kern="0" dirty="0" err="1">
+              <a:rPr lang="en-US" sz="1200" b="1" kern="0">
                 <a:solidFill>
                   <a:srgbClr val="FFFFFF"/>
                 </a:solidFill>
@@ -19991,19 +19991,16 @@
                 <a:ea typeface="Source Sans Pro Light" charset="0"/>
                 <a:cs typeface="Source Sans Pro Light" charset="0"/>
               </a:rPr>
-              <a:t>MicroEJ</a:t>
-            </a:r>
-            <a:r>
-              <a:rPr lang="en-US" sz="1200" b="1" kern="0" dirty="0">
-                <a:solidFill>
-                  <a:srgbClr val="FFFFFF"/>
-                </a:solidFill>
-                <a:latin typeface="Source Sans Pro Light" charset="0"/>
-                <a:ea typeface="Source Sans Pro Light" charset="0"/>
-                <a:cs typeface="Source Sans Pro Light" charset="0"/>
-              </a:rPr>
-              <a:t> Platform</a:t>
-            </a:r>
+              <a:t>VEE Port</a:t>
+            </a:r>
+            <a:endParaRPr lang="en-US" sz="1200" b="1" kern="0" dirty="0">
+              <a:solidFill>
+                <a:srgbClr val="FFFFFF"/>
+              </a:solidFill>
+              <a:latin typeface="Source Sans Pro Light" charset="0"/>
+              <a:ea typeface="Source Sans Pro Light" charset="0"/>
+              <a:cs typeface="Source Sans Pro Light" charset="0"/>
+            </a:endParaRPr>
           </a:p>
         </p:txBody>
       </p:sp>
@@ -20064,7 +20061,7 @@
               <a:defRPr/>
             </a:pPr>
             <a:r>
-              <a:rPr lang="en-US" sz="1200" b="1" kern="0" dirty="0" err="1">
+              <a:rPr lang="en-US" sz="1200" b="1" kern="0">
                 <a:solidFill>
                   <a:srgbClr val="FFFFFF"/>
                 </a:solidFill>
@@ -20072,7 +20069,7 @@
                 <a:ea typeface="Source Sans Pro Light" charset="0"/>
                 <a:cs typeface="Source Sans Pro Light" charset="0"/>
               </a:rPr>
-              <a:t>MicroEJ</a:t>
+              <a:t>Application </a:t>
             </a:r>
             <a:r>
               <a:rPr lang="en-US" sz="1200" b="1" kern="0" dirty="0">
@@ -20083,7 +20080,7 @@
                 <a:ea typeface="Source Sans Pro Light" charset="0"/>
                 <a:cs typeface="Source Sans Pro Light" charset="0"/>
               </a:rPr>
-              <a:t> Application code</a:t>
+              <a:t>code</a:t>
             </a:r>
             <a:endParaRPr kumimoji="0" lang="en-US" sz="1200" b="1" u="none" strike="noStrike" kern="0" cap="none" spc="0" normalizeH="0" baseline="0" noProof="0" dirty="0">
               <a:ln>
@@ -20161,7 +20158,7 @@
               <a:defRPr/>
             </a:pPr>
             <a:r>
-              <a:rPr kumimoji="0" lang="en-US" sz="1100" b="0" u="none" strike="noStrike" kern="0" cap="none" spc="0" normalizeH="0" baseline="0" noProof="0" dirty="0" err="1">
+              <a:rPr kumimoji="0" lang="en-US" sz="1100" b="0" u="none" strike="noStrike" kern="0" cap="none" spc="0" normalizeH="0" baseline="0" noProof="0">
                 <a:ln>
                   <a:noFill/>
                 </a:ln>
@@ -20175,25 +20172,22 @@
                 <a:ea typeface="Source Sans Pro Light" charset="0"/>
                 <a:cs typeface="Source Sans Pro Light" charset="0"/>
               </a:rPr>
-              <a:t>MicroEJ</a:t>
-            </a:r>
-            <a:r>
-              <a:rPr kumimoji="0" lang="en-US" sz="1100" b="0" u="none" strike="noStrike" kern="0" cap="none" spc="0" normalizeH="0" baseline="0" noProof="0" dirty="0">
-                <a:ln>
-                  <a:noFill/>
-                </a:ln>
-                <a:solidFill>
-                  <a:srgbClr val="4B5357"/>
-                </a:solidFill>
-                <a:effectLst/>
-                <a:uLnTx/>
-                <a:uFillTx/>
-                <a:latin typeface="Source Sans Pro Light" charset="0"/>
-                <a:ea typeface="Source Sans Pro Light" charset="0"/>
-                <a:cs typeface="Source Sans Pro Light" charset="0"/>
-              </a:rPr>
-              <a:t> Firmware</a:t>
-            </a:r>
+              <a:t>Executable</a:t>
+            </a:r>
+            <a:endParaRPr kumimoji="0" lang="en-US" sz="1100" b="0" u="none" strike="noStrike" kern="0" cap="none" spc="0" normalizeH="0" baseline="0" noProof="0" dirty="0">
+              <a:ln>
+                <a:noFill/>
+              </a:ln>
+              <a:solidFill>
+                <a:srgbClr val="4B5357"/>
+              </a:solidFill>
+              <a:effectLst/>
+              <a:uLnTx/>
+              <a:uFillTx/>
+              <a:latin typeface="Source Sans Pro Light" charset="0"/>
+              <a:ea typeface="Source Sans Pro Light" charset="0"/>
+              <a:cs typeface="Source Sans Pro Light" charset="0"/>
+            </a:endParaRPr>
           </a:p>
         </p:txBody>
       </p:sp>
@@ -20454,7 +20448,7 @@
               <a:defRPr/>
             </a:pPr>
             <a:r>
-              <a:rPr lang="en-US" sz="1200" b="1" kern="0" dirty="0" err="1">
+              <a:rPr lang="en-US" sz="1200" b="1" kern="0">
                 <a:solidFill>
                   <a:srgbClr val="FFFFFF"/>
                 </a:solidFill>
@@ -20462,19 +20456,16 @@
                 <a:ea typeface="Source Sans Pro Light" charset="0"/>
                 <a:cs typeface="Source Sans Pro Light" charset="0"/>
               </a:rPr>
-              <a:t>MicroEJ</a:t>
-            </a:r>
-            <a:r>
-              <a:rPr lang="en-US" sz="1200" b="1" kern="0" dirty="0">
-                <a:solidFill>
-                  <a:srgbClr val="FFFFFF"/>
-                </a:solidFill>
-                <a:latin typeface="Source Sans Pro Light" charset="0"/>
-                <a:ea typeface="Source Sans Pro Light" charset="0"/>
-                <a:cs typeface="Source Sans Pro Light" charset="0"/>
-              </a:rPr>
-              <a:t> Platform</a:t>
-            </a:r>
+              <a:t>VEE Port</a:t>
+            </a:r>
+            <a:endParaRPr lang="en-US" sz="1200" b="1" kern="0" dirty="0">
+              <a:solidFill>
+                <a:srgbClr val="FFFFFF"/>
+              </a:solidFill>
+              <a:latin typeface="Source Sans Pro Light" charset="0"/>
+              <a:ea typeface="Source Sans Pro Light" charset="0"/>
+              <a:cs typeface="Source Sans Pro Light" charset="0"/>
+            </a:endParaRPr>
           </a:p>
         </p:txBody>
       </p:sp>
@@ -20535,7 +20526,7 @@
               <a:defRPr/>
             </a:pPr>
             <a:r>
-              <a:rPr lang="en-US" sz="1200" b="1" kern="0" dirty="0" err="1">
+              <a:rPr lang="en-US" sz="1200" b="1" kern="0">
                 <a:solidFill>
                   <a:srgbClr val="FFFFFF"/>
                 </a:solidFill>
@@ -20543,7 +20534,7 @@
                 <a:ea typeface="Source Sans Pro Light" charset="0"/>
                 <a:cs typeface="Source Sans Pro Light" charset="0"/>
               </a:rPr>
-              <a:t>MicroEJ</a:t>
+              <a:t>Application </a:t>
             </a:r>
             <a:r>
               <a:rPr lang="en-US" sz="1200" b="1" kern="0" dirty="0">
@@ -20554,7 +20545,7 @@
                 <a:ea typeface="Source Sans Pro Light" charset="0"/>
                 <a:cs typeface="Source Sans Pro Light" charset="0"/>
               </a:rPr>
-              <a:t> Application code</a:t>
+              <a:t>code</a:t>
             </a:r>
             <a:endParaRPr kumimoji="0" lang="en-US" sz="1200" b="1" u="none" strike="noStrike" kern="0" cap="none" spc="0" normalizeH="0" baseline="0" noProof="0" dirty="0">
               <a:ln>
@@ -20632,7 +20623,7 @@
               <a:defRPr/>
             </a:pPr>
             <a:r>
-              <a:rPr kumimoji="0" lang="en-US" sz="1100" b="0" u="none" strike="noStrike" kern="0" cap="none" spc="0" normalizeH="0" baseline="0" noProof="0" dirty="0" err="1">
+              <a:rPr kumimoji="0" lang="en-US" sz="1100" b="0" u="none" strike="noStrike" kern="0" cap="none" spc="0" normalizeH="0" baseline="0" noProof="0">
                 <a:ln>
                   <a:noFill/>
                 </a:ln>
@@ -20646,25 +20637,22 @@
                 <a:ea typeface="Source Sans Pro Light" charset="0"/>
                 <a:cs typeface="Source Sans Pro Light" charset="0"/>
               </a:rPr>
-              <a:t>MicroEJ</a:t>
-            </a:r>
-            <a:r>
-              <a:rPr kumimoji="0" lang="en-US" sz="1100" b="0" u="none" strike="noStrike" kern="0" cap="none" spc="0" normalizeH="0" baseline="0" noProof="0" dirty="0">
-                <a:ln>
-                  <a:noFill/>
-                </a:ln>
-                <a:solidFill>
-                  <a:srgbClr val="4B5357"/>
-                </a:solidFill>
-                <a:effectLst/>
-                <a:uLnTx/>
-                <a:uFillTx/>
-                <a:latin typeface="Source Sans Pro Light" charset="0"/>
-                <a:ea typeface="Source Sans Pro Light" charset="0"/>
-                <a:cs typeface="Source Sans Pro Light" charset="0"/>
-              </a:rPr>
-              <a:t> Firmware</a:t>
-            </a:r>
+              <a:t>Executable</a:t>
+            </a:r>
+            <a:endParaRPr kumimoji="0" lang="en-US" sz="1100" b="0" u="none" strike="noStrike" kern="0" cap="none" spc="0" normalizeH="0" baseline="0" noProof="0" dirty="0">
+              <a:ln>
+                <a:noFill/>
+              </a:ln>
+              <a:solidFill>
+                <a:srgbClr val="4B5357"/>
+              </a:solidFill>
+              <a:effectLst/>
+              <a:uLnTx/>
+              <a:uFillTx/>
+              <a:latin typeface="Source Sans Pro Light" charset="0"/>
+              <a:ea typeface="Source Sans Pro Light" charset="0"/>
+              <a:cs typeface="Source Sans Pro Light" charset="0"/>
+            </a:endParaRPr>
           </a:p>
         </p:txBody>
       </p:sp>
@@ -21003,7 +20991,7 @@
               <a:defRPr/>
             </a:pPr>
             <a:r>
-              <a:rPr lang="en-US" sz="1200" b="1" kern="0" dirty="0" err="1">
+              <a:rPr lang="en-US" sz="1200" b="1" kern="0">
                 <a:solidFill>
                   <a:srgbClr val="FFFFFF"/>
                 </a:solidFill>
@@ -21011,19 +20999,16 @@
                 <a:ea typeface="Source Sans Pro Light" charset="0"/>
                 <a:cs typeface="Source Sans Pro Light" charset="0"/>
               </a:rPr>
-              <a:t>MicroEJ</a:t>
-            </a:r>
-            <a:r>
-              <a:rPr lang="en-US" sz="1200" b="1" kern="0" dirty="0">
-                <a:solidFill>
-                  <a:srgbClr val="FFFFFF"/>
-                </a:solidFill>
-                <a:latin typeface="Source Sans Pro Light" charset="0"/>
-                <a:ea typeface="Source Sans Pro Light" charset="0"/>
-                <a:cs typeface="Source Sans Pro Light" charset="0"/>
-              </a:rPr>
-              <a:t> Platform</a:t>
-            </a:r>
+              <a:t>VEE Port</a:t>
+            </a:r>
+            <a:endParaRPr lang="en-US" sz="1200" b="1" kern="0" dirty="0">
+              <a:solidFill>
+                <a:srgbClr val="FFFFFF"/>
+              </a:solidFill>
+              <a:latin typeface="Source Sans Pro Light" charset="0"/>
+              <a:ea typeface="Source Sans Pro Light" charset="0"/>
+              <a:cs typeface="Source Sans Pro Light" charset="0"/>
+            </a:endParaRPr>
           </a:p>
         </p:txBody>
       </p:sp>
@@ -21084,7 +21069,7 @@
               <a:defRPr/>
             </a:pPr>
             <a:r>
-              <a:rPr lang="en-US" sz="1200" b="1" kern="0" dirty="0" err="1">
+              <a:rPr lang="en-US" sz="1200" b="1" kern="0">
                 <a:solidFill>
                   <a:srgbClr val="FFFFFF"/>
                 </a:solidFill>
@@ -21092,7 +21077,7 @@
                 <a:ea typeface="Source Sans Pro Light" charset="0"/>
                 <a:cs typeface="Source Sans Pro Light" charset="0"/>
               </a:rPr>
-              <a:t>MicroEJ</a:t>
+              <a:t>Application </a:t>
             </a:r>
             <a:r>
               <a:rPr lang="en-US" sz="1200" b="1" kern="0" dirty="0">
@@ -21103,7 +21088,7 @@
                 <a:ea typeface="Source Sans Pro Light" charset="0"/>
                 <a:cs typeface="Source Sans Pro Light" charset="0"/>
               </a:rPr>
-              <a:t> Application code</a:t>
+              <a:t>code</a:t>
             </a:r>
             <a:endParaRPr kumimoji="0" lang="en-US" sz="1200" b="1" u="none" strike="noStrike" kern="0" cap="none" spc="0" normalizeH="0" baseline="0" noProof="0" dirty="0">
               <a:ln>
@@ -21181,7 +21166,7 @@
               <a:defRPr/>
             </a:pPr>
             <a:r>
-              <a:rPr kumimoji="0" lang="en-US" sz="1100" b="0" u="none" strike="noStrike" kern="0" cap="none" spc="0" normalizeH="0" baseline="0" noProof="0" dirty="0" err="1">
+              <a:rPr kumimoji="0" lang="en-US" sz="1100" b="0" u="none" strike="noStrike" kern="0" cap="none" spc="0" normalizeH="0" baseline="0" noProof="0">
                 <a:ln>
                   <a:noFill/>
                 </a:ln>
@@ -21195,25 +21180,22 @@
                 <a:ea typeface="Source Sans Pro Light" charset="0"/>
                 <a:cs typeface="Source Sans Pro Light" charset="0"/>
               </a:rPr>
-              <a:t>MicroEJ</a:t>
-            </a:r>
-            <a:r>
-              <a:rPr kumimoji="0" lang="en-US" sz="1100" b="0" u="none" strike="noStrike" kern="0" cap="none" spc="0" normalizeH="0" baseline="0" noProof="0" dirty="0">
-                <a:ln>
-                  <a:noFill/>
-                </a:ln>
-                <a:solidFill>
-                  <a:srgbClr val="4B5357"/>
-                </a:solidFill>
-                <a:effectLst/>
-                <a:uLnTx/>
-                <a:uFillTx/>
-                <a:latin typeface="Source Sans Pro Light" charset="0"/>
-                <a:ea typeface="Source Sans Pro Light" charset="0"/>
-                <a:cs typeface="Source Sans Pro Light" charset="0"/>
-              </a:rPr>
-              <a:t> Firmware</a:t>
-            </a:r>
+              <a:t>Executable</a:t>
+            </a:r>
+            <a:endParaRPr kumimoji="0" lang="en-US" sz="1100" b="0" u="none" strike="noStrike" kern="0" cap="none" spc="0" normalizeH="0" baseline="0" noProof="0" dirty="0">
+              <a:ln>
+                <a:noFill/>
+              </a:ln>
+              <a:solidFill>
+                <a:srgbClr val="4B5357"/>
+              </a:solidFill>
+              <a:effectLst/>
+              <a:uLnTx/>
+              <a:uFillTx/>
+              <a:latin typeface="Source Sans Pro Light" charset="0"/>
+              <a:ea typeface="Source Sans Pro Light" charset="0"/>
+              <a:cs typeface="Source Sans Pro Light" charset="0"/>
+            </a:endParaRPr>
           </a:p>
         </p:txBody>
       </p:sp>

</xml_diff>